<commit_message>
added section header to pptx generation
</commit_message>
<xml_diff>
--- a/out/test_output_option_5.pptx.final.pptx
+++ b/out/test_output_option_5.pptx.final.pptx
@@ -23,17 +23,17 @@
   <p:extLst>
     <p:ext uri="{521415D9-36F7-43E2-AB2F-B90AF26B5E84}">
       <p14:sectionLst xmlns:p14="http://schemas.microsoft.com/office/powerpoint/2010/main">
-        <p14:section name="Overview" id="{D956B1B9-1898-4AB0-A561-8AF5DD739E89}">
+        <p14:section name="What is Dungeons And Dragons" id="{3C6C907E-052A-4105-B899-56A8F214E79E}">
           <p14:sldIdLst>
             <p14:sldId id="258"/>
           </p14:sldIdLst>
         </p14:section>
-        <p14:section name="Overview of Dungeons And Dragons Adventurers League" id="{D217C1B3-EE72-42A8-8FC8-6AB9002E1EE4}">
+        <p14:section name="What is DD Adventurers League" id="{E2BFE927-F99A-4845-8220-F98345A28D18}">
           <p14:sldIdLst>
             <p14:sldId id="262"/>
           </p14:sldIdLst>
         </p14:section>
-        <p14:section name="Impact on Renewal of Interest" id="{11DEF247-DF74-43A4-ABF7-6908B66879F1}">
+        <p14:section name="Impact on the Renewal of Interest in DD" id="{5B513EE4-0852-48EF-9B31-5F770DC38330}">
           <p14:sldIdLst>
             <p14:sldId id="264"/>
           </p14:sldIdLst>
@@ -2613,6 +2613,48 @@
       <p:grpSpPr/>
       <p:sp>
         <p:nvSpPr>
+          <p:cNvPr id="4" name="Rounded Rectangle 3"/>
+          <p:cNvSpPr/>
+          <p:nvPr/>
+        </p:nvSpPr>
+        <p:spPr>
+          <a:xfrm>
+            <a:off x="182880" y="2314376"/>
+            <a:ext cx="9540240" cy="4177864"/>
+          </a:xfrm>
+          <a:prstGeom prst="roundRect">
+            <a:avLst>
+              <a:gd name="adj" fmla="val 4166"/>
+            </a:avLst>
+          </a:prstGeom>
+          <a:ln>
+            <a:noFill/>
+          </a:ln>
+        </p:spPr>
+        <p:style>
+          <a:lnRef idx="1">
+            <a:schemeClr val="accent1"/>
+          </a:lnRef>
+          <a:fillRef idx="3">
+            <a:schemeClr val="accent1"/>
+          </a:fillRef>
+          <a:effectRef idx="2">
+            <a:schemeClr val="accent1"/>
+          </a:effectRef>
+          <a:fontRef idx="minor">
+            <a:schemeClr val="lt1"/>
+          </a:fontRef>
+        </p:style>
+        <p:txBody>
+          <a:bodyPr rtlCol="0" anchor="ctr"/>
+          <a:lstStyle/>
+          <a:p>
+            <a:pPr algn="ctr"/>
+          </a:p>
+        </p:txBody>
+      </p:sp>
+      <p:sp>
+        <p:nvSpPr>
           <p:cNvPr id="2" name="Title 1"/>
           <p:cNvSpPr>
             <a:spLocks noGrp="1"/>
@@ -2638,7 +2680,7 @@
               <a:defRPr sz="3000"/>
             </a:pPr>
             <a:r>
-              <a:t>Contribution to Growth</a:t>
+              <a:t>Factors Contributing to Renewal</a:t>
             </a:r>
           </a:p>
         </p:txBody>
@@ -2656,7 +2698,7 @@
         <p:spPr>
           <a:xfrm>
             <a:off x="182880" y="838200"/>
-            <a:ext cx="9540240" cy="5654040"/>
+            <a:ext cx="9540240" cy="1130808"/>
           </a:xfrm>
         </p:spPr>
         <p:txBody>
@@ -2669,7 +2711,7 @@
               <a:defRPr sz="1800"/>
             </a:pPr>
             <a:r>
-              <a:t>Provided a structured and accessible way for new players to start playing</a:t>
+              <a:t>Increased accessibility for new players</a:t>
             </a:r>
           </a:p>
           <a:p>
@@ -2677,7 +2719,7 @@
               <a:defRPr sz="1800"/>
             </a:pPr>
             <a:r>
-              <a:t>Created a sense of community among players through shared experiences</a:t>
+              <a:t>Engaging organized play events and conventions</a:t>
             </a:r>
           </a:p>
           <a:p>
@@ -2685,7 +2727,87 @@
               <a:defRPr sz="1800"/>
             </a:pPr>
             <a:r>
-              <a:t>Increased visibility of the game through events and social media engagement</a:t>
+              <a:t>Continuously evolving storylines and content</a:t>
+            </a:r>
+          </a:p>
+        </p:txBody>
+      </p:sp>
+      <p:sp>
+        <p:nvSpPr>
+          <p:cNvPr id="2" name="Title 1"/>
+          <p:cNvSpPr>
+            <a:spLocks noGrp="1"/>
+          </p:cNvSpPr>
+          <p:nvPr>
+            <p:ph type="title"/>
+          </p:nvPr>
+        </p:nvSpPr>
+        <p:spPr>
+          <a:xfrm>
+            <a:off x="182880" y="1969008"/>
+            <a:ext cx="9540240" cy="345368"/>
+          </a:xfrm>
+        </p:spPr>
+        <p:txBody>
+          <a:bodyPr anchor="t"/>
+          <a:lstStyle/>
+          <a:p>
+            <a:pPr algn="ctr">
+              <a:spcAft>
+                <a:spcPts val="0"/>
+              </a:spcAft>
+              <a:defRPr sz="2000"/>
+            </a:pPr>
+            <a:r>
+              <a:t>Community Testimonials</a:t>
+            </a:r>
+          </a:p>
+        </p:txBody>
+      </p:sp>
+      <p:sp>
+        <p:nvSpPr>
+          <p:cNvPr id="3" name="Text Placeholder 2"/>
+          <p:cNvSpPr>
+            <a:spLocks noGrp="1"/>
+          </p:cNvSpPr>
+          <p:nvPr>
+            <p:ph type="body" idx="1" sz="half"/>
+          </p:nvPr>
+        </p:nvSpPr>
+        <p:spPr>
+          <a:xfrm>
+            <a:off x="182880" y="2314376"/>
+            <a:ext cx="9540240" cy="4177864"/>
+          </a:xfrm>
+          <a:noFill/>
+        </p:spPr>
+        <p:txBody>
+          <a:bodyPr>
+            <a:normAutofit/>
+          </a:bodyPr>
+          <a:lstStyle/>
+          <a:p>
+            <a:pPr>
+              <a:defRPr sz="1800"/>
+            </a:pPr>
+            <a:r>
+              <a:t>Positive impact on player engagement and retention</a:t>
+            </a:r>
+          </a:p>
+          <a:p>
+            <a:pPr>
+              <a:defRPr sz="1800"/>
+            </a:pPr>
+            <a:r>
+              <a:t>Fostering a sense of belonging in gaming communities</a:t>
+            </a:r>
+          </a:p>
+          <a:p>
+            <a:pPr>
+              <a:defRPr sz="1800"/>
+            </a:pPr>
+            <a:r>
+              <a:t>Inspiring creative storytelling and role-playing</a:t>
             </a:r>
           </a:p>
         </p:txBody>
@@ -2751,7 +2873,7 @@
               <a:defRPr sz="2800"/>
             </a:pPr>
             <a:r>
-              <a:t>A Fantasy Role-Playing Game</a:t>
+              <a:t>A fantasy tabletop role-playing game</a:t>
             </a:r>
           </a:p>
         </p:txBody>
@@ -2793,7 +2915,7 @@
               <a:defRPr sz="4000"/>
             </a:pPr>
             <a:r>
-              <a:t>Overview</a:t>
+              <a:t>What is Dungeons And Dragons?</a:t>
             </a:r>
           </a:p>
         </p:txBody>
@@ -2817,7 +2939,7 @@
               <a:defRPr sz="2800"/>
             </a:pPr>
             <a:r>
-              <a:t>░░░░░░░░░░░░░░░░░░░░░░░░░</a:t>
+              <a:t>D&amp;D is a collaborative storytelling game set in a fantasy world</a:t>
             </a:r>
           </a:p>
         </p:txBody>
@@ -2867,7 +2989,7 @@
               <a:defRPr sz="3000"/>
             </a:pPr>
             <a:r>
-              <a:t>What is Dungeons And Dragons?</a:t>
+              <a:t>Key Features</a:t>
             </a:r>
           </a:p>
         </p:txBody>
@@ -2898,7 +3020,7 @@
               <a:defRPr sz="1800"/>
             </a:pPr>
             <a:r>
-              <a:t>D&amp;D is a tabletop role-playing game (RPG) where players create characters and embark on adventures in a fantasy world.</a:t>
+              <a:t>Players create characters with unique abilities</a:t>
             </a:r>
           </a:p>
           <a:p>
@@ -2906,7 +3028,15 @@
               <a:defRPr sz="1800"/>
             </a:pPr>
             <a:r>
-              <a:t>Players explore dungeons, solve puzzles, fight monsters, and interact with NPCs (non-player characters) to progress through the story.</a:t>
+              <a:t>Game Master guides the narrative and controls the world</a:t>
+            </a:r>
+          </a:p>
+          <a:p>
+            <a:pPr>
+              <a:defRPr sz="1800"/>
+            </a:pPr>
+            <a:r>
+              <a:t>Uses dice rolls to determine outcomes</a:t>
             </a:r>
           </a:p>
         </p:txBody>
@@ -2956,7 +3086,7 @@
               <a:defRPr sz="3000"/>
             </a:pPr>
             <a:r>
-              <a:t>Key Components</a:t>
+              <a:t>Gameplay</a:t>
             </a:r>
           </a:p>
         </p:txBody>
@@ -2987,7 +3117,7 @@
               <a:defRPr sz="1800"/>
             </a:pPr>
             <a:r>
-              <a:t>Player Characters (PCs) - Characters created by players to interact with the game world and story.</a:t>
+              <a:t>Players interact with the world through role-playing</a:t>
             </a:r>
           </a:p>
           <a:p>
@@ -2995,7 +3125,7 @@
               <a:defRPr sz="1800"/>
             </a:pPr>
             <a:r>
-              <a:t>Dungeon Master (DM) - Acts as the storyteller, referee, and controls NPCs, monsters, and the world's events.</a:t>
+              <a:t>Combat is resolved using dice rolls and character abilities</a:t>
             </a:r>
           </a:p>
           <a:p>
@@ -3003,7 +3133,7 @@
               <a:defRPr sz="1800"/>
             </a:pPr>
             <a:r>
-              <a:t>Dice - Used to determine the outcomes of actions, combat, and events in the game.</a:t>
+              <a:t>Collaborative storytelling creates immersive adventures</a:t>
             </a:r>
           </a:p>
         </p:txBody>
@@ -3069,7 +3199,7 @@
               <a:defRPr sz="2800"/>
             </a:pPr>
             <a:r>
-              <a:t>Contribution to the Renewal of Interest</a:t>
+              <a:t>Contribution to the renewal of interest in the game</a:t>
             </a:r>
           </a:p>
         </p:txBody>
@@ -3111,7 +3241,7 @@
               <a:defRPr sz="4000"/>
             </a:pPr>
             <a:r>
-              <a:t>Overview of Dungeons And Dragons Adventurers League</a:t>
+              <a:t>What is D🫰D Adventurers League?</a:t>
             </a:r>
           </a:p>
         </p:txBody>
@@ -3135,7 +3265,7 @@
               <a:defRPr sz="2800"/>
             </a:pPr>
             <a:r>
-              <a:t>░░░░░░░░░░░░░░░░░░░░░░░░░</a:t>
+              <a:t>An organized play program for Dungeons &amp; Dragons</a:t>
             </a:r>
           </a:p>
         </p:txBody>
@@ -3160,6 +3290,48 @@
       <p:grpSpPr/>
       <p:sp>
         <p:nvSpPr>
+          <p:cNvPr id="4" name="Rounded Rectangle 3"/>
+          <p:cNvSpPr/>
+          <p:nvPr/>
+        </p:nvSpPr>
+        <p:spPr>
+          <a:xfrm>
+            <a:off x="182880" y="2314376"/>
+            <a:ext cx="9540240" cy="4177864"/>
+          </a:xfrm>
+          <a:prstGeom prst="roundRect">
+            <a:avLst>
+              <a:gd name="adj" fmla="val 4166"/>
+            </a:avLst>
+          </a:prstGeom>
+          <a:ln>
+            <a:noFill/>
+          </a:ln>
+        </p:spPr>
+        <p:style>
+          <a:lnRef idx="1">
+            <a:schemeClr val="accent1"/>
+          </a:lnRef>
+          <a:fillRef idx="3">
+            <a:schemeClr val="accent1"/>
+          </a:fillRef>
+          <a:effectRef idx="2">
+            <a:schemeClr val="accent1"/>
+          </a:effectRef>
+          <a:fontRef idx="minor">
+            <a:schemeClr val="lt1"/>
+          </a:fontRef>
+        </p:style>
+        <p:txBody>
+          <a:bodyPr rtlCol="0" anchor="ctr"/>
+          <a:lstStyle/>
+          <a:p>
+            <a:pPr algn="ctr"/>
+          </a:p>
+        </p:txBody>
+      </p:sp>
+      <p:sp>
+        <p:nvSpPr>
           <p:cNvPr id="2" name="Title 1"/>
           <p:cNvSpPr>
             <a:spLocks noGrp="1"/>
@@ -3185,7 +3357,7 @@
               <a:defRPr sz="3000"/>
             </a:pPr>
             <a:r>
-              <a:t>Key Points</a:t>
+              <a:t>Key Elements of D🫰D Adventurers League</a:t>
             </a:r>
           </a:p>
         </p:txBody>
@@ -3203,7 +3375,7 @@
         <p:spPr>
           <a:xfrm>
             <a:off x="182880" y="838200"/>
-            <a:ext cx="9540240" cy="5654040"/>
+            <a:ext cx="9540240" cy="1130808"/>
           </a:xfrm>
         </p:spPr>
         <p:txBody>
@@ -3216,7 +3388,7 @@
               <a:defRPr sz="1800"/>
             </a:pPr>
             <a:r>
-              <a:t>Organized play system by Wizards of the Coast</a:t>
+              <a:t>Structured campaign with shared storylines</a:t>
             </a:r>
           </a:p>
           <a:p>
@@ -3224,7 +3396,7 @@
               <a:defRPr sz="1800"/>
             </a:pPr>
             <a:r>
-              <a:t>Allows players to create characters and play in official campaigns</a:t>
+              <a:t>Official D&amp;D play supported by Wizards of the Coast</a:t>
             </a:r>
           </a:p>
           <a:p>
@@ -3232,7 +3404,87 @@
               <a:defRPr sz="1800"/>
             </a:pPr>
             <a:r>
-              <a:t>Events held at local game stores, conventions, and online platforms</a:t>
+              <a:t>Accessible to all players and DMs</a:t>
+            </a:r>
+          </a:p>
+        </p:txBody>
+      </p:sp>
+      <p:sp>
+        <p:nvSpPr>
+          <p:cNvPr id="2" name="Title 1"/>
+          <p:cNvSpPr>
+            <a:spLocks noGrp="1"/>
+          </p:cNvSpPr>
+          <p:nvPr>
+            <p:ph type="title"/>
+          </p:nvPr>
+        </p:nvSpPr>
+        <p:spPr>
+          <a:xfrm>
+            <a:off x="182880" y="1969008"/>
+            <a:ext cx="9540240" cy="345368"/>
+          </a:xfrm>
+        </p:spPr>
+        <p:txBody>
+          <a:bodyPr anchor="t"/>
+          <a:lstStyle/>
+          <a:p>
+            <a:pPr algn="ctr">
+              <a:spcAft>
+                <a:spcPts val="0"/>
+              </a:spcAft>
+              <a:defRPr sz="2000"/>
+            </a:pPr>
+            <a:r>
+              <a:t>Benefits of D🫰D Adventurers League</a:t>
+            </a:r>
+          </a:p>
+        </p:txBody>
+      </p:sp>
+      <p:sp>
+        <p:nvSpPr>
+          <p:cNvPr id="3" name="Text Placeholder 2"/>
+          <p:cNvSpPr>
+            <a:spLocks noGrp="1"/>
+          </p:cNvSpPr>
+          <p:nvPr>
+            <p:ph type="body" idx="1" sz="half"/>
+          </p:nvPr>
+        </p:nvSpPr>
+        <p:spPr>
+          <a:xfrm>
+            <a:off x="182880" y="2314376"/>
+            <a:ext cx="9540240" cy="4177864"/>
+          </a:xfrm>
+          <a:noFill/>
+        </p:spPr>
+        <p:txBody>
+          <a:bodyPr>
+            <a:normAutofit/>
+          </a:bodyPr>
+          <a:lstStyle/>
+          <a:p>
+            <a:pPr>
+              <a:defRPr sz="1800"/>
+            </a:pPr>
+            <a:r>
+              <a:t>Builds community and connection among players</a:t>
+            </a:r>
+          </a:p>
+          <a:p>
+            <a:pPr>
+              <a:defRPr sz="1800"/>
+            </a:pPr>
+            <a:r>
+              <a:t>Promotes inclusivity and diversity</a:t>
+            </a:r>
+          </a:p>
+          <a:p>
+            <a:pPr>
+              <a:defRPr sz="1800"/>
+            </a:pPr>
+            <a:r>
+              <a:t>Encourages teamwork and cooperation</a:t>
             </a:r>
           </a:p>
         </p:txBody>
@@ -3274,7 +3526,7 @@
               <a:defRPr sz="4000"/>
             </a:pPr>
             <a:r>
-              <a:t>Impact on Renewal of Interest</a:t>
+              <a:t>Impact on the Renewal of Interest in D🫰D</a:t>
             </a:r>
           </a:p>
         </p:txBody>
@@ -3298,7 +3550,7 @@
               <a:defRPr sz="2800"/>
             </a:pPr>
             <a:r>
-              <a:t>░░░░░░░░░░░░░░░░░░░░░░░░░</a:t>
+              <a:t>How D&amp;D Adventurers League revitalized the game</a:t>
             </a:r>
           </a:p>
         </p:txBody>

</xml_diff>